<commit_message>
updated presentation, added graphs
</commit_message>
<xml_diff>
--- a/DOC/G4_Portes.pptx
+++ b/DOC/G4_Portes.pptx
@@ -9206,8 +9206,8 @@
         </p:blipFill>
         <p:spPr>
           <a:xfrm>
-            <a:off x="4779150" y="740225"/>
-            <a:ext cx="4215900" cy="3161925"/>
+            <a:off x="4697574" y="1371249"/>
+            <a:ext cx="4278528" cy="3208900"/>
           </a:xfrm>
           <a:prstGeom prst="rect">
             <a:avLst/>
@@ -9234,8 +9234,8 @@
         </p:blipFill>
         <p:spPr>
           <a:xfrm>
-            <a:off x="395150" y="927750"/>
-            <a:ext cx="4215900" cy="3161925"/>
+            <a:off x="106600" y="1301175"/>
+            <a:ext cx="4465398" cy="3349048"/>
           </a:xfrm>
           <a:prstGeom prst="rect">
             <a:avLst/>

</xml_diff>